<commit_message>
Kubernetes 101 - Pod updates
</commit_message>
<xml_diff>
--- a/slides/01-docker-101.pptx
+++ b/slides/01-docker-101.pptx
@@ -209,7 +209,7 @@
           <a:p>
             <a:fld id="{3D3BD7A2-1C8E-4B49-ADF0-02BFB1DDE38A}" type="datetimeFigureOut">
               <a:rPr lang="en-US" smtClean="0"/>
-              <a:t>10/22/2019</a:t>
+              <a:t>5/26/2020</a:t>
             </a:fld>
             <a:endParaRPr lang="en-US"/>
           </a:p>
@@ -1568,7 +1568,7 @@
                 </a:solidFill>
               </a:rPr>
               <a:pPr/>
-              <a:t>22/10/2019</a:t>
+              <a:t>26/05/2020</a:t>
             </a:fld>
             <a:endParaRPr lang="en-GB">
               <a:solidFill>
@@ -1770,7 +1770,7 @@
                 </a:solidFill>
               </a:rPr>
               <a:pPr/>
-              <a:t>22/10/2019</a:t>
+              <a:t>26/05/2020</a:t>
             </a:fld>
             <a:endParaRPr lang="en-GB">
               <a:solidFill>
@@ -1982,7 +1982,7 @@
                 </a:solidFill>
               </a:rPr>
               <a:pPr/>
-              <a:t>22/10/2019</a:t>
+              <a:t>26/05/2020</a:t>
             </a:fld>
             <a:endParaRPr lang="en-GB">
               <a:solidFill>
@@ -4194,7 +4194,7 @@
                 </a:solidFill>
               </a:rPr>
               <a:pPr/>
-              <a:t>22/10/2019</a:t>
+              <a:t>26/05/2020</a:t>
             </a:fld>
             <a:endParaRPr lang="en-GB">
               <a:solidFill>
@@ -5688,7 +5688,7 @@
                 </a:solidFill>
               </a:rPr>
               <a:pPr/>
-              <a:t>22/10/2019</a:t>
+              <a:t>26/05/2020</a:t>
             </a:fld>
             <a:endParaRPr lang="en-GB">
               <a:solidFill>
@@ -6104,7 +6104,7 @@
           <a:p>
             <a:fld id="{5AF0053F-4205-439F-B829-BA821FBF09D4}" type="datetimeFigureOut">
               <a:rPr lang="en-GB" smtClean="0"/>
-              <a:t>22/10/2019</a:t>
+              <a:t>26/05/2020</a:t>
             </a:fld>
             <a:endParaRPr lang="en-GB"/>
           </a:p>
@@ -6429,7 +6429,7 @@
           <a:p>
             <a:fld id="{5AF0053F-4205-439F-B829-BA821FBF09D4}" type="datetimeFigureOut">
               <a:rPr lang="en-GB" smtClean="0"/>
-              <a:t>22/10/2019</a:t>
+              <a:t>26/05/2020</a:t>
             </a:fld>
             <a:endParaRPr lang="en-GB"/>
           </a:p>
@@ -6599,7 +6599,7 @@
           <a:p>
             <a:fld id="{5AF0053F-4205-439F-B829-BA821FBF09D4}" type="datetimeFigureOut">
               <a:rPr lang="en-GB" smtClean="0"/>
-              <a:t>22/10/2019</a:t>
+              <a:t>26/05/2020</a:t>
             </a:fld>
             <a:endParaRPr lang="en-GB"/>
           </a:p>
@@ -6845,7 +6845,7 @@
           <a:p>
             <a:fld id="{5AF0053F-4205-439F-B829-BA821FBF09D4}" type="datetimeFigureOut">
               <a:rPr lang="en-GB" smtClean="0"/>
-              <a:t>22/10/2019</a:t>
+              <a:t>26/05/2020</a:t>
             </a:fld>
             <a:endParaRPr lang="en-GB"/>
           </a:p>
@@ -7077,7 +7077,7 @@
           <a:p>
             <a:fld id="{5AF0053F-4205-439F-B829-BA821FBF09D4}" type="datetimeFigureOut">
               <a:rPr lang="en-GB" smtClean="0"/>
-              <a:t>22/10/2019</a:t>
+              <a:t>26/05/2020</a:t>
             </a:fld>
             <a:endParaRPr lang="en-GB"/>
           </a:p>
@@ -7444,7 +7444,7 @@
           <a:p>
             <a:fld id="{5AF0053F-4205-439F-B829-BA821FBF09D4}" type="datetimeFigureOut">
               <a:rPr lang="en-GB" smtClean="0"/>
-              <a:t>22/10/2019</a:t>
+              <a:t>26/05/2020</a:t>
             </a:fld>
             <a:endParaRPr lang="en-GB"/>
           </a:p>
@@ -7562,7 +7562,7 @@
           <a:p>
             <a:fld id="{5AF0053F-4205-439F-B829-BA821FBF09D4}" type="datetimeFigureOut">
               <a:rPr lang="en-GB" smtClean="0"/>
-              <a:t>22/10/2019</a:t>
+              <a:t>26/05/2020</a:t>
             </a:fld>
             <a:endParaRPr lang="en-GB"/>
           </a:p>
@@ -7657,7 +7657,7 @@
           <a:p>
             <a:fld id="{5AF0053F-4205-439F-B829-BA821FBF09D4}" type="datetimeFigureOut">
               <a:rPr lang="en-GB" smtClean="0"/>
-              <a:t>22/10/2019</a:t>
+              <a:t>26/05/2020</a:t>
             </a:fld>
             <a:endParaRPr lang="en-GB"/>
           </a:p>
@@ -7896,7 +7896,7 @@
                 </a:solidFill>
               </a:rPr>
               <a:pPr/>
-              <a:t>22/10/2019</a:t>
+              <a:t>26/05/2020</a:t>
             </a:fld>
             <a:endParaRPr lang="en-GB">
               <a:solidFill>
@@ -8198,7 +8198,7 @@
           <a:p>
             <a:fld id="{5AF0053F-4205-439F-B829-BA821FBF09D4}" type="datetimeFigureOut">
               <a:rPr lang="en-GB" smtClean="0"/>
-              <a:t>22/10/2019</a:t>
+              <a:t>26/05/2020</a:t>
             </a:fld>
             <a:endParaRPr lang="en-GB"/>
           </a:p>
@@ -8451,7 +8451,7 @@
           <a:p>
             <a:fld id="{5AF0053F-4205-439F-B829-BA821FBF09D4}" type="datetimeFigureOut">
               <a:rPr lang="en-GB" smtClean="0"/>
-              <a:t>22/10/2019</a:t>
+              <a:t>26/05/2020</a:t>
             </a:fld>
             <a:endParaRPr lang="en-GB"/>
           </a:p>
@@ -8621,7 +8621,7 @@
           <a:p>
             <a:fld id="{5AF0053F-4205-439F-B829-BA821FBF09D4}" type="datetimeFigureOut">
               <a:rPr lang="en-GB" smtClean="0"/>
-              <a:t>22/10/2019</a:t>
+              <a:t>26/05/2020</a:t>
             </a:fld>
             <a:endParaRPr lang="en-GB"/>
           </a:p>
@@ -8801,7 +8801,7 @@
           <a:p>
             <a:fld id="{5AF0053F-4205-439F-B829-BA821FBF09D4}" type="datetimeFigureOut">
               <a:rPr lang="en-GB" smtClean="0"/>
-              <a:t>22/10/2019</a:t>
+              <a:t>26/05/2020</a:t>
             </a:fld>
             <a:endParaRPr lang="en-GB"/>
           </a:p>
@@ -9300,7 +9300,7 @@
                 </a:solidFill>
               </a:rPr>
               <a:pPr/>
-              <a:t>22/10/2019</a:t>
+              <a:t>26/05/2020</a:t>
             </a:fld>
             <a:endParaRPr lang="en-GB">
               <a:solidFill>
@@ -9450,7 +9450,7 @@
                 </a:solidFill>
               </a:rPr>
               <a:pPr/>
-              <a:t>22/10/2019</a:t>
+              <a:t>26/05/2020</a:t>
             </a:fld>
             <a:endParaRPr lang="en-GB">
               <a:solidFill>
@@ -9577,7 +9577,7 @@
                 </a:solidFill>
               </a:rPr>
               <a:pPr/>
-              <a:t>22/10/2019</a:t>
+              <a:t>26/05/2020</a:t>
             </a:fld>
             <a:endParaRPr lang="en-GB">
               <a:solidFill>
@@ -9886,7 +9886,7 @@
                 </a:solidFill>
               </a:rPr>
               <a:pPr/>
-              <a:t>22/10/2019</a:t>
+              <a:t>26/05/2020</a:t>
             </a:fld>
             <a:endParaRPr lang="en-GB">
               <a:solidFill>
@@ -10171,7 +10171,7 @@
                 </a:solidFill>
               </a:rPr>
               <a:pPr/>
-              <a:t>22/10/2019</a:t>
+              <a:t>26/05/2020</a:t>
             </a:fld>
             <a:endParaRPr lang="en-GB">
               <a:solidFill>
@@ -10417,7 +10417,7 @@
                 </a:solidFill>
               </a:rPr>
               <a:pPr defTabSz="685783"/>
-              <a:t>22/10/2019</a:t>
+              <a:t>26/05/2020</a:t>
             </a:fld>
             <a:endParaRPr lang="en-GB">
               <a:solidFill>
@@ -11399,7 +11399,7 @@
           <a:p>
             <a:fld id="{5AF0053F-4205-439F-B829-BA821FBF09D4}" type="datetimeFigureOut">
               <a:rPr lang="en-GB" smtClean="0"/>
-              <a:t>22/10/2019</a:t>
+              <a:t>26/05/2020</a:t>
             </a:fld>
             <a:endParaRPr lang="en-GB"/>
           </a:p>
@@ -16663,10 +16663,21 @@
                 </a:solidFill>
                 <a:latin typeface="Consolas" panose="020B0609020204030204" pitchFamily="49" charset="0"/>
               </a:rPr>
-              <a:t>mcr.microsoft.com/dotnet/core/sdk:3.0.100</a:t>
-            </a:r>
-            <a:r>
-              <a:rPr lang="en-GB" sz="1800" dirty="0">
+              <a:t>mcr.microsoft.com/dotnet/core/sdk</a:t>
+            </a:r>
+            <a:r>
+              <a:rPr lang="en-GB" sz="1800">
+                <a:solidFill>
+                  <a:schemeClr val="bg1">
+                    <a:lumMod val="95000"/>
+                  </a:schemeClr>
+                </a:solidFill>
+                <a:latin typeface="Consolas" panose="020B0609020204030204" pitchFamily="49" charset="0"/>
+              </a:rPr>
+              <a:t>:3.1.300</a:t>
+            </a:r>
+            <a:r>
+              <a:rPr lang="en-GB" sz="1800">
                 <a:solidFill>
                   <a:srgbClr val="BBBBBB"/>
                 </a:solidFill>
@@ -16927,8 +16938,27 @@
                 </a:solidFill>
                 <a:latin typeface="Consolas" panose="020B0609020204030204" pitchFamily="49" charset="0"/>
               </a:rPr>
-              <a:t>mcr.microsoft.com/dotnet/core/aspnet:3.0</a:t>
-            </a:r>
+              <a:t>mcr.microsoft.com/dotnet/core/aspnet</a:t>
+            </a:r>
+            <a:r>
+              <a:rPr lang="en-GB" sz="1800">
+                <a:solidFill>
+                  <a:schemeClr val="bg1">
+                    <a:lumMod val="95000"/>
+                  </a:schemeClr>
+                </a:solidFill>
+                <a:latin typeface="Consolas" panose="020B0609020204030204" pitchFamily="49" charset="0"/>
+              </a:rPr>
+              <a:t>:3.1.4</a:t>
+            </a:r>
+            <a:endParaRPr lang="en-GB" sz="1800" dirty="0">
+              <a:solidFill>
+                <a:schemeClr val="bg1">
+                  <a:lumMod val="95000"/>
+                </a:schemeClr>
+              </a:solidFill>
+              <a:latin typeface="Consolas" panose="020B0609020204030204" pitchFamily="49" charset="0"/>
+            </a:endParaRPr>
           </a:p>
           <a:p>
             <a:pPr marL="0" indent="0">
@@ -17196,10 +17226,21 @@
                 </a:solidFill>
                 <a:latin typeface="Consolas" panose="020B0609020204030204" pitchFamily="49" charset="0"/>
               </a:rPr>
-              <a:t>mcr.microsoft.com/dotnet/core/sdk:3.0.100</a:t>
-            </a:r>
-            <a:r>
-              <a:rPr lang="en-GB" sz="1800" dirty="0">
+              <a:t>mcr.microsoft.com/dotnet/core/sdk</a:t>
+            </a:r>
+            <a:r>
+              <a:rPr lang="en-GB" sz="1800">
+                <a:solidFill>
+                  <a:schemeClr val="bg1">
+                    <a:lumMod val="95000"/>
+                  </a:schemeClr>
+                </a:solidFill>
+                <a:latin typeface="Consolas" panose="020B0609020204030204" pitchFamily="49" charset="0"/>
+              </a:rPr>
+              <a:t>:3.1.300</a:t>
+            </a:r>
+            <a:r>
+              <a:rPr lang="en-GB" sz="1800">
                 <a:solidFill>
                   <a:srgbClr val="BBBBBB"/>
                 </a:solidFill>
@@ -17460,8 +17501,27 @@
                 </a:solidFill>
                 <a:latin typeface="Consolas" panose="020B0609020204030204" pitchFamily="49" charset="0"/>
               </a:rPr>
-              <a:t>mcr.microsoft.com/dotnet/core/aspnet:3.0</a:t>
-            </a:r>
+              <a:t>mcr.microsoft.com/dotnet/core/aspnet</a:t>
+            </a:r>
+            <a:r>
+              <a:rPr lang="en-GB" sz="1800">
+                <a:solidFill>
+                  <a:schemeClr val="bg1">
+                    <a:lumMod val="95000"/>
+                  </a:schemeClr>
+                </a:solidFill>
+                <a:latin typeface="Consolas" panose="020B0609020204030204" pitchFamily="49" charset="0"/>
+              </a:rPr>
+              <a:t>:3.1.4</a:t>
+            </a:r>
+            <a:endParaRPr lang="en-GB" sz="1800" dirty="0">
+              <a:solidFill>
+                <a:schemeClr val="bg1">
+                  <a:lumMod val="95000"/>
+                </a:schemeClr>
+              </a:solidFill>
+              <a:latin typeface="Consolas" panose="020B0609020204030204" pitchFamily="49" charset="0"/>
+            </a:endParaRPr>
           </a:p>
           <a:p>
             <a:pPr marL="0" indent="0">
@@ -17853,10 +17913,21 @@
                 </a:solidFill>
                 <a:latin typeface="Consolas" panose="020B0609020204030204" pitchFamily="49" charset="0"/>
               </a:rPr>
-              <a:t>mcr.microsoft.com/dotnet/core/sdk:3.0.100</a:t>
-            </a:r>
-            <a:r>
-              <a:rPr lang="en-GB" sz="1800" dirty="0">
+              <a:t>mcr.microsoft.com/dotnet/core/sdk</a:t>
+            </a:r>
+            <a:r>
+              <a:rPr lang="en-GB" sz="1800">
+                <a:solidFill>
+                  <a:schemeClr val="bg1">
+                    <a:lumMod val="95000"/>
+                  </a:schemeClr>
+                </a:solidFill>
+                <a:latin typeface="Consolas" panose="020B0609020204030204" pitchFamily="49" charset="0"/>
+              </a:rPr>
+              <a:t>:3.1.300</a:t>
+            </a:r>
+            <a:r>
+              <a:rPr lang="en-GB" sz="1800">
                 <a:solidFill>
                   <a:srgbClr val="BBBBBB"/>
                 </a:solidFill>
@@ -18117,8 +18188,27 @@
                 </a:solidFill>
                 <a:latin typeface="Consolas" panose="020B0609020204030204" pitchFamily="49" charset="0"/>
               </a:rPr>
-              <a:t>mcr.microsoft.com/dotnet/core/aspnet:3.0</a:t>
-            </a:r>
+              <a:t>mcr.microsoft.com/dotnet/core/aspnet</a:t>
+            </a:r>
+            <a:r>
+              <a:rPr lang="en-GB" sz="1800">
+                <a:solidFill>
+                  <a:schemeClr val="bg1">
+                    <a:lumMod val="95000"/>
+                  </a:schemeClr>
+                </a:solidFill>
+                <a:latin typeface="Consolas" panose="020B0609020204030204" pitchFamily="49" charset="0"/>
+              </a:rPr>
+              <a:t>:3.1.4</a:t>
+            </a:r>
+            <a:endParaRPr lang="en-GB" sz="1800" dirty="0">
+              <a:solidFill>
+                <a:schemeClr val="bg1">
+                  <a:lumMod val="95000"/>
+                </a:schemeClr>
+              </a:solidFill>
+              <a:latin typeface="Consolas" panose="020B0609020204030204" pitchFamily="49" charset="0"/>
+            </a:endParaRPr>
           </a:p>
           <a:p>
             <a:pPr marL="0" indent="0">
@@ -18428,7 +18518,7 @@
         <p:spPr>
           <a:xfrm>
             <a:off x="318408" y="2327842"/>
-            <a:ext cx="5874509" cy="1954122"/>
+            <a:ext cx="6165184" cy="1954122"/>
           </a:xfrm>
           <a:prstGeom prst="roundRect">
             <a:avLst>
@@ -18489,7 +18579,7 @@
         </p:nvSpPr>
         <p:spPr>
           <a:xfrm>
-            <a:off x="6094333" y="2327842"/>
+            <a:off x="6385008" y="2327842"/>
             <a:ext cx="98584" cy="1954122"/>
           </a:xfrm>
           <a:prstGeom prst="rightBracket">

</xml_diff>